<commit_message>
Konačna verzija 2 (s malim kašnjenjem)
</commit_message>
<xml_diff>
--- a/Dokumentacija/PROINZ_TG10.3_ProjectBajeet.pptx
+++ b/Dokumentacija/PROINZ_TG10.3_ProjectBajeet.pptx
@@ -6,7 +6,7 @@
     <p:sldMasterId id="2147483726" r:id="rId2"/>
   </p:sldMasterIdLst>
   <p:notesMasterIdLst>
-    <p:notesMasterId r:id="rId17"/>
+    <p:notesMasterId r:id="rId15"/>
   </p:notesMasterIdLst>
   <p:sldIdLst>
     <p:sldId id="265" r:id="rId3"/>
@@ -20,9 +20,7 @@
     <p:sldId id="275" r:id="rId11"/>
     <p:sldId id="260" r:id="rId12"/>
     <p:sldId id="262" r:id="rId13"/>
-    <p:sldId id="274" r:id="rId14"/>
-    <p:sldId id="263" r:id="rId15"/>
-    <p:sldId id="264" r:id="rId16"/>
+    <p:sldId id="263" r:id="rId14"/>
   </p:sldIdLst>
   <p:sldSz cx="9144000" cy="6858000" type="screen4x3"/>
   <p:notesSz cx="6858000" cy="9144000"/>
@@ -1451,7 +1449,7 @@
                 <a14:useLocalDpi xmlns:a14="http://schemas.microsoft.com/office/drawing/2010/main" val="0"/>
               </a:ext>
               <a:ext uri="{96DAC541-7B7A-43D3-8B79-37D633B846F1}">
-                <asvg:svgBlip xmlns:asvg="http://schemas.microsoft.com/office/drawing/2016/SVG/main" xmlns="" r:embed="rId6"/>
+                <asvg:svgBlip xmlns="" xmlns:asvg="http://schemas.microsoft.com/office/drawing/2016/SVG/main" r:embed="rId6"/>
               </a:ext>
             </a:extLst>
           </a:blip>
@@ -9993,15 +9991,32 @@
             <p:ph type="title"/>
           </p:nvPr>
         </p:nvSpPr>
-        <p:spPr/>
+        <p:spPr>
+          <a:xfrm>
+            <a:off x="608163" y="512064"/>
+            <a:ext cx="7772400" cy="1609344"/>
+          </a:xfrm>
+        </p:spPr>
         <p:txBody>
           <a:bodyPr/>
           <a:lstStyle/>
           <a:p>
             <a:r>
               <a:rPr lang="hr-HR" noProof="0" dirty="0"/>
-              <a:t>Organizacija rada</a:t>
-            </a:r>
+              <a:t>Organizacija </a:t>
+            </a:r>
+            <a:r>
+              <a:rPr lang="hr-HR" noProof="0" dirty="0" smtClean="0"/>
+              <a:t/>
+            </a:r>
+            <a:br>
+              <a:rPr lang="hr-HR" noProof="0" dirty="0" smtClean="0"/>
+            </a:br>
+            <a:r>
+              <a:rPr lang="hr-HR" noProof="0" dirty="0" smtClean="0"/>
+              <a:t>rada</a:t>
+            </a:r>
+            <a:endParaRPr lang="hr-HR" noProof="0" dirty="0"/>
           </a:p>
         </p:txBody>
       </p:sp>
@@ -10024,8 +10039,13 @@
           <a:p>
             <a:r>
               <a:rPr lang="hr-HR" noProof="0" dirty="0"/>
-              <a:t>Neprogramski (organizacijski) zadaci</a:t>
-            </a:r>
+              <a:t>Neprogramski </a:t>
+            </a:r>
+            <a:r>
+              <a:rPr lang="hr-HR" noProof="0" dirty="0" smtClean="0"/>
+              <a:t>zadaci</a:t>
+            </a:r>
+            <a:endParaRPr lang="hr-HR" noProof="0" dirty="0"/>
           </a:p>
           <a:p>
             <a:pPr lvl="1"/>
@@ -10037,6 +10057,10 @@
               <a:rPr lang="hr-HR" noProof="0" dirty="0" smtClean="0"/>
               <a:t>komunikacije: </a:t>
             </a:r>
+            <a:endParaRPr lang="hr-HR" noProof="0" dirty="0" smtClean="0"/>
+          </a:p>
+          <a:p>
+            <a:pPr lvl="2"/>
             <a:r>
               <a:rPr lang="hr-HR" noProof="0" dirty="0" err="1" smtClean="0">
                 <a:solidFill>
@@ -10055,7 +10079,17 @@
                   </a:schemeClr>
                 </a:solidFill>
               </a:rPr>
-              <a:t> App</a:t>
+              <a:t> </a:t>
+            </a:r>
+            <a:r>
+              <a:rPr lang="hr-HR" noProof="0" dirty="0" smtClean="0">
+                <a:solidFill>
+                  <a:schemeClr val="accent1">
+                    <a:lumMod val="50000"/>
+                  </a:schemeClr>
+                </a:solidFill>
+              </a:rPr>
+              <a:t>App</a:t>
             </a:r>
           </a:p>
           <a:p>
@@ -10068,7 +10102,25 @@
             <a:pPr lvl="1"/>
             <a:r>
               <a:rPr lang="hr-HR" noProof="0" dirty="0"/>
-              <a:t>Primijenjeni model životnog </a:t>
+              <a:t>Primijenjeni model </a:t>
+            </a:r>
+            <a:endParaRPr lang="hr-HR" noProof="0" dirty="0" smtClean="0"/>
+          </a:p>
+          <a:p>
+            <a:pPr marL="274320" lvl="1" indent="0">
+              <a:buNone/>
+            </a:pPr>
+            <a:r>
+              <a:rPr lang="hr-HR" dirty="0"/>
+              <a:t> </a:t>
+            </a:r>
+            <a:r>
+              <a:rPr lang="hr-HR" dirty="0" smtClean="0"/>
+              <a:t>  </a:t>
+            </a:r>
+            <a:r>
+              <a:rPr lang="hr-HR" noProof="0" dirty="0" smtClean="0"/>
+              <a:t>životnog </a:t>
             </a:r>
             <a:r>
               <a:rPr lang="hr-HR" noProof="0" dirty="0" smtClean="0"/>
@@ -10112,20 +10164,6 @@
             </a:pPr>
             <a:endParaRPr lang="hr-HR" noProof="0" dirty="0" smtClean="0"/>
           </a:p>
-          <a:p>
-            <a:pPr marL="457200" lvl="1" indent="0">
-              <a:buNone/>
-            </a:pPr>
-            <a:r>
-              <a:rPr lang="hr-HR" dirty="0"/>
-              <a:t>	</a:t>
-            </a:r>
-            <a:r>
-              <a:rPr lang="hr-HR" dirty="0" smtClean="0"/>
-              <a:t>[INSERT TABLICA ULOIŽENOG TRUDA]</a:t>
-            </a:r>
-            <a:endParaRPr lang="hr-HR" noProof="0" dirty="0"/>
-          </a:p>
         </p:txBody>
       </p:sp>
       <p:sp>
@@ -10151,6 +10189,30 @@
           </a:p>
         </p:txBody>
       </p:sp>
+      <p:pic>
+        <p:nvPicPr>
+          <p:cNvPr id="5" name="Picture 4"/>
+          <p:cNvPicPr>
+            <a:picLocks noChangeAspect="1"/>
+          </p:cNvPicPr>
+          <p:nvPr/>
+        </p:nvPicPr>
+        <p:blipFill>
+          <a:blip r:embed="rId2"/>
+          <a:stretch>
+            <a:fillRect/>
+          </a:stretch>
+        </p:blipFill>
+        <p:spPr>
+          <a:xfrm>
+            <a:off x="4430447" y="230852"/>
+            <a:ext cx="4532959" cy="6344664"/>
+          </a:xfrm>
+          <a:prstGeom prst="rect">
+            <a:avLst/>
+          </a:prstGeom>
+        </p:spPr>
+      </p:pic>
     </p:spTree>
     <p:extLst>
       <p:ext uri="{BB962C8B-B14F-4D97-AF65-F5344CB8AC3E}">
@@ -10183,141 +10245,6 @@
       </p:grpSpPr>
       <p:sp>
         <p:nvSpPr>
-          <p:cNvPr id="2" name="Title 1">
-            <a:extLst>
-              <a:ext uri="{FF2B5EF4-FFF2-40B4-BE49-F238E27FC236}">
-                <a16:creationId xmlns:a16="http://schemas.microsoft.com/office/drawing/2014/main" id="{B2C9CBA8-11D5-D65F-3F83-F59F385AC4BA}"/>
-              </a:ext>
-            </a:extLst>
-          </p:cNvPr>
-          <p:cNvSpPr>
-            <a:spLocks noGrp="1"/>
-          </p:cNvSpPr>
-          <p:nvPr>
-            <p:ph type="title"/>
-          </p:nvPr>
-        </p:nvSpPr>
-        <p:spPr/>
-        <p:txBody>
-          <a:bodyPr/>
-          <a:lstStyle/>
-          <a:p>
-            <a:r>
-              <a:rPr lang="hr-HR" noProof="0" dirty="0"/>
-              <a:t>Demonstracija aplikacije</a:t>
-            </a:r>
-          </a:p>
-        </p:txBody>
-      </p:sp>
-      <p:sp>
-        <p:nvSpPr>
-          <p:cNvPr id="3" name="Content Placeholder 2">
-            <a:extLst>
-              <a:ext uri="{FF2B5EF4-FFF2-40B4-BE49-F238E27FC236}">
-                <a16:creationId xmlns:a16="http://schemas.microsoft.com/office/drawing/2014/main" id="{095ADC07-223F-0954-0AAD-901A9AD8339F}"/>
-              </a:ext>
-            </a:extLst>
-          </p:cNvPr>
-          <p:cNvSpPr>
-            <a:spLocks noGrp="1"/>
-          </p:cNvSpPr>
-          <p:nvPr>
-            <p:ph idx="1"/>
-          </p:nvPr>
-        </p:nvSpPr>
-        <p:spPr/>
-        <p:txBody>
-          <a:bodyPr/>
-          <a:lstStyle/>
-          <a:p>
-            <a:r>
-              <a:rPr lang="hr-HR" dirty="0"/>
-              <a:t>Pokazati ključne funkcionalnosti uživo.</a:t>
-            </a:r>
-          </a:p>
-          <a:p>
-            <a:r>
-              <a:rPr lang="hr-HR" dirty="0"/>
-              <a:t>Fokus na izazove i rješenja (1-2 primjera</a:t>
-            </a:r>
-            <a:r>
-              <a:rPr lang="hr-HR" dirty="0" smtClean="0"/>
-              <a:t>).</a:t>
-            </a:r>
-          </a:p>
-          <a:p>
-            <a:endParaRPr lang="hr-HR" dirty="0"/>
-          </a:p>
-          <a:p>
-            <a:r>
-              <a:rPr lang="hr-HR" dirty="0" smtClean="0"/>
-              <a:t>INSERT SMTH IDK MYB SCREENSHOT????</a:t>
-            </a:r>
-            <a:endParaRPr lang="hr-HR" dirty="0"/>
-          </a:p>
-        </p:txBody>
-      </p:sp>
-      <p:sp>
-        <p:nvSpPr>
-          <p:cNvPr id="4" name="Slide Number Placeholder 3">
-            <a:extLst>
-              <a:ext uri="{FF2B5EF4-FFF2-40B4-BE49-F238E27FC236}">
-                <a16:creationId xmlns:a16="http://schemas.microsoft.com/office/drawing/2014/main" id="{AE76D2D5-F8F8-3548-34C0-61BDD7AAEA8C}"/>
-              </a:ext>
-            </a:extLst>
-          </p:cNvPr>
-          <p:cNvSpPr>
-            <a:spLocks noGrp="1"/>
-          </p:cNvSpPr>
-          <p:nvPr>
-            <p:ph type="sldNum" sz="quarter" idx="12"/>
-          </p:nvPr>
-        </p:nvSpPr>
-        <p:spPr/>
-        <p:txBody>
-          <a:bodyPr/>
-          <a:lstStyle/>
-          <a:p>
-            <a:fld id="{FAA41844-C0CA-4144-9D6C-D993F0C0FAB4}" type="slidenum">
-              <a:rPr lang="hr-HR" smtClean="0"/>
-              <a:t>12</a:t>
-            </a:fld>
-            <a:endParaRPr lang="hr-HR" dirty="0"/>
-          </a:p>
-        </p:txBody>
-      </p:sp>
-    </p:spTree>
-    <p:extLst>
-      <p:ext uri="{BB962C8B-B14F-4D97-AF65-F5344CB8AC3E}">
-        <p14:creationId xmlns:p14="http://schemas.microsoft.com/office/powerpoint/2010/main" val="3208602946"/>
-      </p:ext>
-    </p:extLst>
-  </p:cSld>
-  <p:clrMapOvr>
-    <a:masterClrMapping/>
-  </p:clrMapOvr>
-</p:sld>
-</file>
-
-<file path=ppt/slides/slide13.xml><?xml version="1.0" encoding="utf-8"?>
-<p:sld xmlns:a="http://schemas.openxmlformats.org/drawingml/2006/main" xmlns:r="http://schemas.openxmlformats.org/officeDocument/2006/relationships" xmlns:p="http://schemas.openxmlformats.org/presentationml/2006/main">
-  <p:cSld>
-    <p:spTree>
-      <p:nvGrpSpPr>
-        <p:cNvPr id="1" name=""/>
-        <p:cNvGrpSpPr/>
-        <p:nvPr/>
-      </p:nvGrpSpPr>
-      <p:grpSpPr>
-        <a:xfrm>
-          <a:off x="0" y="0"/>
-          <a:ext cx="0" cy="0"/>
-          <a:chOff x="0" y="0"/>
-          <a:chExt cx="0" cy="0"/>
-        </a:xfrm>
-      </p:grpSpPr>
-      <p:sp>
-        <p:nvSpPr>
           <p:cNvPr id="2" name="Title 1"/>
           <p:cNvSpPr>
             <a:spLocks noGrp="1"/>
@@ -10412,7 +10339,7 @@
           <a:p>
             <a:fld id="{FAA41844-C0CA-4144-9D6C-D993F0C0FAB4}" type="slidenum">
               <a:rPr lang="hr-HR" smtClean="0"/>
-              <a:t>13</a:t>
+              <a:t>12</a:t>
             </a:fld>
             <a:endParaRPr lang="hr-HR" dirty="0"/>
           </a:p>
@@ -10422,163 +10349,6 @@
     <p:extLst>
       <p:ext uri="{BB962C8B-B14F-4D97-AF65-F5344CB8AC3E}">
         <p14:creationId xmlns:p14="http://schemas.microsoft.com/office/powerpoint/2010/main" val="48259320"/>
-      </p:ext>
-    </p:extLst>
-  </p:cSld>
-  <p:clrMapOvr>
-    <a:masterClrMapping/>
-  </p:clrMapOvr>
-</p:sld>
-</file>
-
-<file path=ppt/slides/slide14.xml><?xml version="1.0" encoding="utf-8"?>
-<p:sld xmlns:a="http://schemas.openxmlformats.org/drawingml/2006/main" xmlns:r="http://schemas.openxmlformats.org/officeDocument/2006/relationships" xmlns:p="http://schemas.openxmlformats.org/presentationml/2006/main">
-  <p:cSld>
-    <p:spTree>
-      <p:nvGrpSpPr>
-        <p:cNvPr id="1" name=""/>
-        <p:cNvGrpSpPr/>
-        <p:nvPr/>
-      </p:nvGrpSpPr>
-      <p:grpSpPr>
-        <a:xfrm>
-          <a:off x="0" y="0"/>
-          <a:ext cx="0" cy="0"/>
-          <a:chOff x="0" y="0"/>
-          <a:chExt cx="0" cy="0"/>
-        </a:xfrm>
-      </p:grpSpPr>
-      <p:sp>
-        <p:nvSpPr>
-          <p:cNvPr id="2" name="Title 1"/>
-          <p:cNvSpPr>
-            <a:spLocks noGrp="1"/>
-          </p:cNvSpPr>
-          <p:nvPr>
-            <p:ph type="title"/>
-          </p:nvPr>
-        </p:nvSpPr>
-        <p:spPr/>
-        <p:txBody>
-          <a:bodyPr/>
-          <a:lstStyle/>
-          <a:p>
-            <a:r>
-              <a:rPr lang="hr-HR" i="1" noProof="0" dirty="0"/>
-              <a:t>Nekoliko savjeta</a:t>
-            </a:r>
-          </a:p>
-        </p:txBody>
-      </p:sp>
-      <p:sp>
-        <p:nvSpPr>
-          <p:cNvPr id="3" name="Content Placeholder 2"/>
-          <p:cNvSpPr>
-            <a:spLocks noGrp="1"/>
-          </p:cNvSpPr>
-          <p:nvPr>
-            <p:ph idx="1"/>
-          </p:nvPr>
-        </p:nvSpPr>
-        <p:spPr/>
-        <p:txBody>
-          <a:bodyPr>
-            <a:normAutofit/>
-          </a:bodyPr>
-          <a:lstStyle/>
-          <a:p>
-            <a:r>
-              <a:rPr lang="hr-HR" noProof="0" dirty="0"/>
-              <a:t>10-15 slajdova je sasvim dovoljno – istaknite samo najvažnije činjenice</a:t>
-            </a:r>
-          </a:p>
-          <a:p>
-            <a:r>
-              <a:rPr lang="hr-HR" noProof="0" dirty="0"/>
-              <a:t>Prezentaciju možete grafički urediti prema svojem nahođenju uz ograničenja:</a:t>
-            </a:r>
-          </a:p>
-          <a:p>
-            <a:pPr lvl="1"/>
-            <a:r>
-              <a:rPr lang="hr-HR" noProof="0" dirty="0"/>
-              <a:t>Obavezan sadržaj naslovne stranice</a:t>
-            </a:r>
-          </a:p>
-          <a:p>
-            <a:pPr lvl="1"/>
-            <a:r>
-              <a:rPr lang="hr-HR" noProof="0" dirty="0"/>
-              <a:t>Obavezni brojevi stranica</a:t>
-            </a:r>
-          </a:p>
-          <a:p>
-            <a:r>
-              <a:rPr lang="hr-HR" b="1" noProof="0" dirty="0"/>
-              <a:t>Priprema izlaganja na satu:</a:t>
-            </a:r>
-          </a:p>
-          <a:p>
-            <a:pPr lvl="1"/>
-            <a:r>
-              <a:rPr lang="hr-HR" noProof="0" dirty="0"/>
-              <a:t>Pokrenite sve potrebne programe i alate na računalu prije početka Vašeg izlaganja te provjerite kompatibilnost opreme!</a:t>
-            </a:r>
-          </a:p>
-          <a:p>
-            <a:pPr lvl="2"/>
-            <a:r>
-              <a:rPr lang="hr-HR" dirty="0"/>
-              <a:t>Standardni HDMI priključak. Eduraom.</a:t>
-            </a:r>
-            <a:endParaRPr lang="hr-HR" noProof="0" dirty="0"/>
-          </a:p>
-          <a:p>
-            <a:pPr lvl="1"/>
-            <a:r>
-              <a:rPr lang="pl-PL" dirty="0"/>
-              <a:t>Vježbati izlaganje u 15 minuta.</a:t>
-            </a:r>
-          </a:p>
-          <a:p>
-            <a:pPr lvl="1"/>
-            <a:r>
-              <a:rPr lang="hr-HR" b="1" noProof="0" dirty="0"/>
-              <a:t>Poštujte zadani vremenski okvir!</a:t>
-            </a:r>
-          </a:p>
-          <a:p>
-            <a:endParaRPr lang="hr-HR" noProof="0" dirty="0"/>
-          </a:p>
-        </p:txBody>
-      </p:sp>
-      <p:sp>
-        <p:nvSpPr>
-          <p:cNvPr id="4" name="Slide Number Placeholder 3"/>
-          <p:cNvSpPr>
-            <a:spLocks noGrp="1"/>
-          </p:cNvSpPr>
-          <p:nvPr>
-            <p:ph type="sldNum" sz="quarter" idx="12"/>
-          </p:nvPr>
-        </p:nvSpPr>
-        <p:spPr/>
-        <p:txBody>
-          <a:bodyPr/>
-          <a:lstStyle/>
-          <a:p>
-            <a:fld id="{FAA41844-C0CA-4144-9D6C-D993F0C0FAB4}" type="slidenum">
-              <a:rPr lang="hr-HR" smtClean="0"/>
-              <a:t>14</a:t>
-            </a:fld>
-            <a:endParaRPr lang="hr-HR" dirty="0"/>
-          </a:p>
-        </p:txBody>
-      </p:sp>
-    </p:spTree>
-    <p:extLst>
-      <p:ext uri="{BB962C8B-B14F-4D97-AF65-F5344CB8AC3E}">
-        <p14:creationId xmlns:p14="http://schemas.microsoft.com/office/powerpoint/2010/main" val="3641737146"/>
       </p:ext>
     </p:extLst>
   </p:cSld>

</xml_diff>